<commit_message>
Changes to power booster added to schematic and PCB
</commit_message>
<xml_diff>
--- a/Documents/Block Diagram/ArbPwrBoost_BlockDiagram.pptx
+++ b/Documents/Block Diagram/ArbPwrBoost_BlockDiagram.pptx
@@ -260,7 +260,7 @@
           <a:p>
             <a:fld id="{7C803F88-51BB-45E7-81D6-BE5590E09D46}" type="datetimeFigureOut">
               <a:rPr lang="en-US" smtClean="0"/>
-              <a:t>2/14/2025</a:t>
+              <a:t>4/14/2025</a:t>
             </a:fld>
             <a:endParaRPr lang="en-US"/>
           </a:p>
@@ -458,7 +458,7 @@
           <a:p>
             <a:fld id="{7C803F88-51BB-45E7-81D6-BE5590E09D46}" type="datetimeFigureOut">
               <a:rPr lang="en-US" smtClean="0"/>
-              <a:t>2/14/2025</a:t>
+              <a:t>4/14/2025</a:t>
             </a:fld>
             <a:endParaRPr lang="en-US"/>
           </a:p>
@@ -666,7 +666,7 @@
           <a:p>
             <a:fld id="{7C803F88-51BB-45E7-81D6-BE5590E09D46}" type="datetimeFigureOut">
               <a:rPr lang="en-US" smtClean="0"/>
-              <a:t>2/14/2025</a:t>
+              <a:t>4/14/2025</a:t>
             </a:fld>
             <a:endParaRPr lang="en-US"/>
           </a:p>
@@ -864,7 +864,7 @@
           <a:p>
             <a:fld id="{7C803F88-51BB-45E7-81D6-BE5590E09D46}" type="datetimeFigureOut">
               <a:rPr lang="en-US" smtClean="0"/>
-              <a:t>2/14/2025</a:t>
+              <a:t>4/14/2025</a:t>
             </a:fld>
             <a:endParaRPr lang="en-US"/>
           </a:p>
@@ -1139,7 +1139,7 @@
           <a:p>
             <a:fld id="{7C803F88-51BB-45E7-81D6-BE5590E09D46}" type="datetimeFigureOut">
               <a:rPr lang="en-US" smtClean="0"/>
-              <a:t>2/14/2025</a:t>
+              <a:t>4/14/2025</a:t>
             </a:fld>
             <a:endParaRPr lang="en-US"/>
           </a:p>
@@ -1404,7 +1404,7 @@
           <a:p>
             <a:fld id="{7C803F88-51BB-45E7-81D6-BE5590E09D46}" type="datetimeFigureOut">
               <a:rPr lang="en-US" smtClean="0"/>
-              <a:t>2/14/2025</a:t>
+              <a:t>4/14/2025</a:t>
             </a:fld>
             <a:endParaRPr lang="en-US"/>
           </a:p>
@@ -1816,7 +1816,7 @@
           <a:p>
             <a:fld id="{7C803F88-51BB-45E7-81D6-BE5590E09D46}" type="datetimeFigureOut">
               <a:rPr lang="en-US" smtClean="0"/>
-              <a:t>2/14/2025</a:t>
+              <a:t>4/14/2025</a:t>
             </a:fld>
             <a:endParaRPr lang="en-US"/>
           </a:p>
@@ -1957,7 +1957,7 @@
           <a:p>
             <a:fld id="{7C803F88-51BB-45E7-81D6-BE5590E09D46}" type="datetimeFigureOut">
               <a:rPr lang="en-US" smtClean="0"/>
-              <a:t>2/14/2025</a:t>
+              <a:t>4/14/2025</a:t>
             </a:fld>
             <a:endParaRPr lang="en-US"/>
           </a:p>
@@ -2070,7 +2070,7 @@
           <a:p>
             <a:fld id="{7C803F88-51BB-45E7-81D6-BE5590E09D46}" type="datetimeFigureOut">
               <a:rPr lang="en-US" smtClean="0"/>
-              <a:t>2/14/2025</a:t>
+              <a:t>4/14/2025</a:t>
             </a:fld>
             <a:endParaRPr lang="en-US"/>
           </a:p>
@@ -2381,7 +2381,7 @@
           <a:p>
             <a:fld id="{7C803F88-51BB-45E7-81D6-BE5590E09D46}" type="datetimeFigureOut">
               <a:rPr lang="en-US" smtClean="0"/>
-              <a:t>2/14/2025</a:t>
+              <a:t>4/14/2025</a:t>
             </a:fld>
             <a:endParaRPr lang="en-US"/>
           </a:p>
@@ -2669,7 +2669,7 @@
           <a:p>
             <a:fld id="{7C803F88-51BB-45E7-81D6-BE5590E09D46}" type="datetimeFigureOut">
               <a:rPr lang="en-US" smtClean="0"/>
-              <a:t>2/14/2025</a:t>
+              <a:t>4/14/2025</a:t>
             </a:fld>
             <a:endParaRPr lang="en-US"/>
           </a:p>
@@ -2910,7 +2910,7 @@
           <a:p>
             <a:fld id="{7C803F88-51BB-45E7-81D6-BE5590E09D46}" type="datetimeFigureOut">
               <a:rPr lang="en-US" smtClean="0"/>
-              <a:t>2/14/2025</a:t>
+              <a:t>4/14/2025</a:t>
             </a:fld>
             <a:endParaRPr lang="en-US"/>
           </a:p>
@@ -3381,7 +3381,7 @@
             <a:pPr algn="ctr"/>
             <a:r>
               <a:rPr lang="en-US" sz="1200" dirty="0"/>
-              <a:t>+20V NOMINAL</a:t>
+              <a:t>+15V NOMINAL</a:t>
             </a:r>
           </a:p>
         </p:txBody>
@@ -3440,7 +3440,7 @@
             <a:pPr algn="ctr"/>
             <a:r>
               <a:rPr lang="en-US" sz="1200" dirty="0"/>
-              <a:t>-20V NOMINAL</a:t>
+              <a:t>-15V NOMINAL</a:t>
             </a:r>
           </a:p>
         </p:txBody>
@@ -3476,7 +3476,7 @@
             <a:pPr algn="ctr"/>
             <a:r>
               <a:rPr lang="en-US" dirty="0"/>
-              <a:t>±20V PWR</a:t>
+              <a:t>±15V PWR</a:t>
             </a:r>
           </a:p>
           <a:p>
@@ -4132,7 +4132,7 @@
         <p:spPr>
           <a:xfrm>
             <a:off x="86485" y="1638507"/>
-            <a:ext cx="1314784" cy="369332"/>
+            <a:ext cx="1297406" cy="369332"/>
           </a:xfrm>
           <a:prstGeom prst="rect">
             <a:avLst/>
@@ -4147,7 +4147,7 @@
           <a:p>
             <a:r>
               <a:rPr lang="en-US" dirty="0"/>
-              <a:t>-20V INPUT</a:t>
+              <a:t>-15V INPUT</a:t>
             </a:r>
           </a:p>
         </p:txBody>
@@ -4182,7 +4182,7 @@
           <a:p>
             <a:r>
               <a:rPr lang="en-US" dirty="0"/>
-              <a:t>+20V INPUT</a:t>
+              <a:t>+15V INPUT</a:t>
             </a:r>
           </a:p>
         </p:txBody>
@@ -5632,7 +5632,7 @@
         </p:nvSpPr>
         <p:spPr>
           <a:xfrm>
-            <a:off x="0" y="1671347"/>
+            <a:off x="0" y="840055"/>
             <a:ext cx="772969" cy="307777"/>
           </a:xfrm>
           <a:prstGeom prst="rect">
@@ -6531,7 +6531,7 @@
         </p:nvSpPr>
         <p:spPr>
           <a:xfrm>
-            <a:off x="0" y="5710170"/>
+            <a:off x="19116" y="5667279"/>
             <a:ext cx="772969" cy="307777"/>
           </a:xfrm>
           <a:prstGeom prst="rect">
@@ -7106,7 +7106,7 @@
         <p:spPr>
           <a:xfrm>
             <a:off x="7240946" y="2702614"/>
-            <a:ext cx="508473" cy="276999"/>
+            <a:ext cx="1210588" cy="276999"/>
           </a:xfrm>
           <a:prstGeom prst="rect">
             <a:avLst/>
@@ -7124,7 +7124,7 @@
                 <a:latin typeface="Arial" panose="020B0604020202020204" pitchFamily="34" charset="0"/>
                 <a:cs typeface="Arial" panose="020B0604020202020204" pitchFamily="34" charset="0"/>
               </a:rPr>
-              <a:t>ADC</a:t>
+              <a:t>ADC – IMON 1</a:t>
             </a:r>
           </a:p>
         </p:txBody>
@@ -7144,7 +7144,7 @@
         <p:spPr>
           <a:xfrm>
             <a:off x="7240946" y="3902610"/>
-            <a:ext cx="508473" cy="276999"/>
+            <a:ext cx="1210588" cy="276999"/>
           </a:xfrm>
           <a:prstGeom prst="rect">
             <a:avLst/>
@@ -7162,7 +7162,7 @@
                 <a:latin typeface="Arial" panose="020B0604020202020204" pitchFamily="34" charset="0"/>
                 <a:cs typeface="Arial" panose="020B0604020202020204" pitchFamily="34" charset="0"/>
               </a:rPr>
-              <a:t>ADC</a:t>
+              <a:t>ADC – IMON 2</a:t>
             </a:r>
           </a:p>
         </p:txBody>
@@ -7402,6 +7402,564 @@
           </a:extLst>
         </p:spPr>
       </p:pic>
+      <p:sp>
+        <p:nvSpPr>
+          <p:cNvPr id="11" name="TextBox 10">
+            <a:extLst>
+              <a:ext uri="{FF2B5EF4-FFF2-40B4-BE49-F238E27FC236}">
+                <a16:creationId xmlns:a16="http://schemas.microsoft.com/office/drawing/2014/main" id="{09549EC6-7BB0-3F3E-733D-E8A2D19B1CED}"/>
+              </a:ext>
+            </a:extLst>
+          </p:cNvPr>
+          <p:cNvSpPr txBox="1"/>
+          <p:nvPr/>
+        </p:nvSpPr>
+        <p:spPr>
+          <a:xfrm>
+            <a:off x="7779813" y="3285981"/>
+            <a:ext cx="1705281" cy="276999"/>
+          </a:xfrm>
+          <a:prstGeom prst="rect">
+            <a:avLst/>
+          </a:prstGeom>
+          <a:noFill/>
+          <a:ln>
+            <a:solidFill>
+              <a:schemeClr val="accent1"/>
+            </a:solidFill>
+          </a:ln>
+        </p:spPr>
+        <p:txBody>
+          <a:bodyPr wrap="square" rtlCol="0">
+            <a:spAutoFit/>
+          </a:bodyPr>
+          <a:lstStyle/>
+          <a:p>
+            <a:r>
+              <a:rPr lang="en-US" sz="1200" dirty="0">
+                <a:latin typeface="Arial" panose="020B0604020202020204" pitchFamily="34" charset="0"/>
+                <a:cs typeface="Arial" panose="020B0604020202020204" pitchFamily="34" charset="0"/>
+              </a:rPr>
+              <a:t>3.3V SYSTEM PWR</a:t>
+            </a:r>
+          </a:p>
+        </p:txBody>
+      </p:sp>
+      <p:cxnSp>
+        <p:nvCxnSpPr>
+          <p:cNvPr id="14" name="Straight Arrow Connector 13">
+            <a:extLst>
+              <a:ext uri="{FF2B5EF4-FFF2-40B4-BE49-F238E27FC236}">
+                <a16:creationId xmlns:a16="http://schemas.microsoft.com/office/drawing/2014/main" id="{6E18EF53-479C-012F-C64D-F75276B905CF}"/>
+              </a:ext>
+            </a:extLst>
+          </p:cNvPr>
+          <p:cNvCxnSpPr>
+            <a:cxnSpLocks/>
+            <a:stCxn id="30" idx="3"/>
+            <a:endCxn id="11" idx="1"/>
+          </p:cNvCxnSpPr>
+          <p:nvPr/>
+        </p:nvCxnSpPr>
+        <p:spPr>
+          <a:xfrm flipV="1">
+            <a:off x="6997239" y="3424481"/>
+            <a:ext cx="782574" cy="4519"/>
+          </a:xfrm>
+          <a:prstGeom prst="straightConnector1">
+            <a:avLst/>
+          </a:prstGeom>
+          <a:ln>
+            <a:tailEnd type="triangle"/>
+          </a:ln>
+        </p:spPr>
+        <p:style>
+          <a:lnRef idx="2">
+            <a:schemeClr val="accent1"/>
+          </a:lnRef>
+          <a:fillRef idx="0">
+            <a:schemeClr val="accent1"/>
+          </a:fillRef>
+          <a:effectRef idx="1">
+            <a:schemeClr val="accent1"/>
+          </a:effectRef>
+          <a:fontRef idx="minor">
+            <a:schemeClr val="tx1"/>
+          </a:fontRef>
+        </p:style>
+      </p:cxnSp>
+      <p:cxnSp>
+        <p:nvCxnSpPr>
+          <p:cNvPr id="26" name="Connector: Elbow 25">
+            <a:extLst>
+              <a:ext uri="{FF2B5EF4-FFF2-40B4-BE49-F238E27FC236}">
+                <a16:creationId xmlns:a16="http://schemas.microsoft.com/office/drawing/2014/main" id="{31D6A56C-12D3-614C-2BFF-97419898C046}"/>
+              </a:ext>
+            </a:extLst>
+          </p:cNvPr>
+          <p:cNvCxnSpPr/>
+          <p:nvPr/>
+        </p:nvCxnSpPr>
+        <p:spPr>
+          <a:xfrm rot="16200000" flipV="1">
+            <a:off x="1794315" y="1958417"/>
+            <a:ext cx="1371718" cy="274048"/>
+          </a:xfrm>
+          <a:prstGeom prst="bentConnector3">
+            <a:avLst>
+              <a:gd name="adj1" fmla="val 699"/>
+            </a:avLst>
+          </a:prstGeom>
+          <a:ln>
+            <a:headEnd type="triangle"/>
+            <a:tailEnd type="none"/>
+          </a:ln>
+        </p:spPr>
+        <p:style>
+          <a:lnRef idx="2">
+            <a:schemeClr val="accent1"/>
+          </a:lnRef>
+          <a:fillRef idx="0">
+            <a:schemeClr val="accent1"/>
+          </a:fillRef>
+          <a:effectRef idx="1">
+            <a:schemeClr val="accent1"/>
+          </a:effectRef>
+          <a:fontRef idx="minor">
+            <a:schemeClr val="tx1"/>
+          </a:fontRef>
+        </p:style>
+      </p:cxnSp>
+      <p:cxnSp>
+        <p:nvCxnSpPr>
+          <p:cNvPr id="31" name="Connector: Elbow 30">
+            <a:extLst>
+              <a:ext uri="{FF2B5EF4-FFF2-40B4-BE49-F238E27FC236}">
+                <a16:creationId xmlns:a16="http://schemas.microsoft.com/office/drawing/2014/main" id="{54B1D798-03B9-C76C-70E7-E0CBDE99EE46}"/>
+              </a:ext>
+            </a:extLst>
+          </p:cNvPr>
+          <p:cNvCxnSpPr/>
+          <p:nvPr/>
+        </p:nvCxnSpPr>
+        <p:spPr>
+          <a:xfrm rot="5400000">
+            <a:off x="1789348" y="4611452"/>
+            <a:ext cx="1381652" cy="274048"/>
+          </a:xfrm>
+          <a:prstGeom prst="bentConnector3">
+            <a:avLst>
+              <a:gd name="adj1" fmla="val -1015"/>
+            </a:avLst>
+          </a:prstGeom>
+          <a:ln>
+            <a:headEnd type="triangle"/>
+            <a:tailEnd type="none"/>
+          </a:ln>
+        </p:spPr>
+        <p:style>
+          <a:lnRef idx="2">
+            <a:schemeClr val="accent1"/>
+          </a:lnRef>
+          <a:fillRef idx="0">
+            <a:schemeClr val="accent1"/>
+          </a:fillRef>
+          <a:effectRef idx="1">
+            <a:schemeClr val="accent1"/>
+          </a:effectRef>
+          <a:fontRef idx="minor">
+            <a:schemeClr val="tx1"/>
+          </a:fontRef>
+        </p:style>
+      </p:cxnSp>
+      <p:sp>
+        <p:nvSpPr>
+          <p:cNvPr id="34" name="TextBox 33">
+            <a:extLst>
+              <a:ext uri="{FF2B5EF4-FFF2-40B4-BE49-F238E27FC236}">
+                <a16:creationId xmlns:a16="http://schemas.microsoft.com/office/drawing/2014/main" id="{ABB08F9F-8F0E-31E6-3AF9-430002BF0BF9}"/>
+              </a:ext>
+            </a:extLst>
+          </p:cNvPr>
+          <p:cNvSpPr txBox="1"/>
+          <p:nvPr/>
+        </p:nvSpPr>
+        <p:spPr>
+          <a:xfrm>
+            <a:off x="2341708" y="4350287"/>
+            <a:ext cx="1184491" cy="276999"/>
+          </a:xfrm>
+          <a:prstGeom prst="rect">
+            <a:avLst/>
+          </a:prstGeom>
+          <a:noFill/>
+        </p:spPr>
+        <p:txBody>
+          <a:bodyPr wrap="none" rtlCol="0">
+            <a:spAutoFit/>
+          </a:bodyPr>
+          <a:lstStyle/>
+          <a:p>
+            <a:r>
+              <a:rPr lang="en-US" sz="1200" dirty="0">
+                <a:latin typeface="Arial" panose="020B0604020202020204" pitchFamily="34" charset="0"/>
+                <a:cs typeface="Arial" panose="020B0604020202020204" pitchFamily="34" charset="0"/>
+              </a:rPr>
+              <a:t>ADC ARB IN 2</a:t>
+            </a:r>
+          </a:p>
+        </p:txBody>
+      </p:sp>
+      <p:sp>
+        <p:nvSpPr>
+          <p:cNvPr id="35" name="TextBox 34">
+            <a:extLst>
+              <a:ext uri="{FF2B5EF4-FFF2-40B4-BE49-F238E27FC236}">
+                <a16:creationId xmlns:a16="http://schemas.microsoft.com/office/drawing/2014/main" id="{5CF4A3EE-372A-9274-BC0A-8EBCAB37E93A}"/>
+              </a:ext>
+            </a:extLst>
+          </p:cNvPr>
+          <p:cNvSpPr txBox="1"/>
+          <p:nvPr/>
+        </p:nvSpPr>
+        <p:spPr>
+          <a:xfrm>
+            <a:off x="2302191" y="2224753"/>
+            <a:ext cx="1184491" cy="276999"/>
+          </a:xfrm>
+          <a:prstGeom prst="rect">
+            <a:avLst/>
+          </a:prstGeom>
+          <a:noFill/>
+        </p:spPr>
+        <p:txBody>
+          <a:bodyPr wrap="none" rtlCol="0">
+            <a:spAutoFit/>
+          </a:bodyPr>
+          <a:lstStyle/>
+          <a:p>
+            <a:r>
+              <a:rPr lang="en-US" sz="1200" dirty="0">
+                <a:latin typeface="Arial" panose="020B0604020202020204" pitchFamily="34" charset="0"/>
+                <a:cs typeface="Arial" panose="020B0604020202020204" pitchFamily="34" charset="0"/>
+              </a:rPr>
+              <a:t>ADC ARB IN 1</a:t>
+            </a:r>
+          </a:p>
+        </p:txBody>
+      </p:sp>
+      <p:cxnSp>
+        <p:nvCxnSpPr>
+          <p:cNvPr id="37" name="Connector: Elbow 36">
+            <a:extLst>
+              <a:ext uri="{FF2B5EF4-FFF2-40B4-BE49-F238E27FC236}">
+                <a16:creationId xmlns:a16="http://schemas.microsoft.com/office/drawing/2014/main" id="{243D7A11-5FAE-2981-D074-F32A3387B13E}"/>
+              </a:ext>
+            </a:extLst>
+          </p:cNvPr>
+          <p:cNvCxnSpPr>
+            <a:endCxn id="1026" idx="2"/>
+          </p:cNvCxnSpPr>
+          <p:nvPr/>
+        </p:nvCxnSpPr>
+        <p:spPr>
+          <a:xfrm rot="10800000">
+            <a:off x="386486" y="1678141"/>
+            <a:ext cx="2209458" cy="1464686"/>
+          </a:xfrm>
+          <a:prstGeom prst="bentConnector2">
+            <a:avLst/>
+          </a:prstGeom>
+          <a:ln>
+            <a:tailEnd type="triangle"/>
+          </a:ln>
+        </p:spPr>
+        <p:style>
+          <a:lnRef idx="2">
+            <a:schemeClr val="accent1"/>
+          </a:lnRef>
+          <a:fillRef idx="0">
+            <a:schemeClr val="accent1"/>
+          </a:fillRef>
+          <a:effectRef idx="1">
+            <a:schemeClr val="accent1"/>
+          </a:effectRef>
+          <a:fontRef idx="minor">
+            <a:schemeClr val="tx1"/>
+          </a:fontRef>
+        </p:style>
+      </p:cxnSp>
+      <p:cxnSp>
+        <p:nvCxnSpPr>
+          <p:cNvPr id="41" name="Connector: Elbow 40">
+            <a:extLst>
+              <a:ext uri="{FF2B5EF4-FFF2-40B4-BE49-F238E27FC236}">
+                <a16:creationId xmlns:a16="http://schemas.microsoft.com/office/drawing/2014/main" id="{8645B9AC-1CC6-E125-664C-60FA79A1DB8A}"/>
+              </a:ext>
+            </a:extLst>
+          </p:cNvPr>
+          <p:cNvCxnSpPr>
+            <a:endCxn id="1074" idx="0"/>
+          </p:cNvCxnSpPr>
+          <p:nvPr/>
+        </p:nvCxnSpPr>
+        <p:spPr>
+          <a:xfrm rot="10800000" flipV="1">
+            <a:off x="386486" y="3650825"/>
+            <a:ext cx="2209458" cy="1529033"/>
+          </a:xfrm>
+          <a:prstGeom prst="bentConnector2">
+            <a:avLst/>
+          </a:prstGeom>
+          <a:ln>
+            <a:tailEnd type="triangle"/>
+          </a:ln>
+        </p:spPr>
+        <p:style>
+          <a:lnRef idx="2">
+            <a:schemeClr val="accent1"/>
+          </a:lnRef>
+          <a:fillRef idx="0">
+            <a:schemeClr val="accent1"/>
+          </a:fillRef>
+          <a:effectRef idx="1">
+            <a:schemeClr val="accent1"/>
+          </a:effectRef>
+          <a:fontRef idx="minor">
+            <a:schemeClr val="tx1"/>
+          </a:fontRef>
+        </p:style>
+      </p:cxnSp>
+      <p:cxnSp>
+        <p:nvCxnSpPr>
+          <p:cNvPr id="43" name="Straight Arrow Connector 42">
+            <a:extLst>
+              <a:ext uri="{FF2B5EF4-FFF2-40B4-BE49-F238E27FC236}">
+                <a16:creationId xmlns:a16="http://schemas.microsoft.com/office/drawing/2014/main" id="{154651F7-16FC-65BF-72CD-1F4B209D5138}"/>
+              </a:ext>
+            </a:extLst>
+          </p:cNvPr>
+          <p:cNvCxnSpPr/>
+          <p:nvPr/>
+        </p:nvCxnSpPr>
+        <p:spPr>
+          <a:xfrm>
+            <a:off x="5729440" y="2219653"/>
+            <a:ext cx="0" cy="409729"/>
+          </a:xfrm>
+          <a:prstGeom prst="straightConnector1">
+            <a:avLst/>
+          </a:prstGeom>
+          <a:ln>
+            <a:tailEnd type="triangle"/>
+          </a:ln>
+        </p:spPr>
+        <p:style>
+          <a:lnRef idx="2">
+            <a:schemeClr val="accent1"/>
+          </a:lnRef>
+          <a:fillRef idx="0">
+            <a:schemeClr val="accent1"/>
+          </a:fillRef>
+          <a:effectRef idx="1">
+            <a:schemeClr val="accent1"/>
+          </a:effectRef>
+          <a:fontRef idx="minor">
+            <a:schemeClr val="tx1"/>
+          </a:fontRef>
+        </p:style>
+      </p:cxnSp>
+      <p:sp>
+        <p:nvSpPr>
+          <p:cNvPr id="44" name="TextBox 43">
+            <a:extLst>
+              <a:ext uri="{FF2B5EF4-FFF2-40B4-BE49-F238E27FC236}">
+                <a16:creationId xmlns:a16="http://schemas.microsoft.com/office/drawing/2014/main" id="{D2CE9F9F-9751-EF0E-09EC-541560079BF0}"/>
+              </a:ext>
+            </a:extLst>
+          </p:cNvPr>
+          <p:cNvSpPr txBox="1"/>
+          <p:nvPr/>
+        </p:nvSpPr>
+        <p:spPr>
+          <a:xfrm>
+            <a:off x="5254992" y="1978116"/>
+            <a:ext cx="949299" cy="276999"/>
+          </a:xfrm>
+          <a:prstGeom prst="rect">
+            <a:avLst/>
+          </a:prstGeom>
+          <a:noFill/>
+        </p:spPr>
+        <p:txBody>
+          <a:bodyPr wrap="none" rtlCol="0">
+            <a:spAutoFit/>
+          </a:bodyPr>
+          <a:lstStyle/>
+          <a:p>
+            <a:r>
+              <a:rPr lang="en-US" sz="1200" dirty="0">
+                <a:latin typeface="Arial" panose="020B0604020202020204" pitchFamily="34" charset="0"/>
+                <a:cs typeface="Arial" panose="020B0604020202020204" pitchFamily="34" charset="0"/>
+              </a:rPr>
+              <a:t>+15V MON</a:t>
+            </a:r>
+          </a:p>
+        </p:txBody>
+      </p:sp>
+      <p:cxnSp>
+        <p:nvCxnSpPr>
+          <p:cNvPr id="45" name="Straight Arrow Connector 44">
+            <a:extLst>
+              <a:ext uri="{FF2B5EF4-FFF2-40B4-BE49-F238E27FC236}">
+                <a16:creationId xmlns:a16="http://schemas.microsoft.com/office/drawing/2014/main" id="{E28AF7FF-C010-ADE5-5604-B5C34CD8175E}"/>
+              </a:ext>
+            </a:extLst>
+          </p:cNvPr>
+          <p:cNvCxnSpPr/>
+          <p:nvPr/>
+        </p:nvCxnSpPr>
+        <p:spPr>
+          <a:xfrm>
+            <a:off x="6699389" y="2219653"/>
+            <a:ext cx="0" cy="409729"/>
+          </a:xfrm>
+          <a:prstGeom prst="straightConnector1">
+            <a:avLst/>
+          </a:prstGeom>
+          <a:ln>
+            <a:tailEnd type="triangle"/>
+          </a:ln>
+        </p:spPr>
+        <p:style>
+          <a:lnRef idx="2">
+            <a:schemeClr val="accent1"/>
+          </a:lnRef>
+          <a:fillRef idx="0">
+            <a:schemeClr val="accent1"/>
+          </a:fillRef>
+          <a:effectRef idx="1">
+            <a:schemeClr val="accent1"/>
+          </a:effectRef>
+          <a:fontRef idx="minor">
+            <a:schemeClr val="tx1"/>
+          </a:fontRef>
+        </p:style>
+      </p:cxnSp>
+      <p:sp>
+        <p:nvSpPr>
+          <p:cNvPr id="46" name="TextBox 45">
+            <a:extLst>
+              <a:ext uri="{FF2B5EF4-FFF2-40B4-BE49-F238E27FC236}">
+                <a16:creationId xmlns:a16="http://schemas.microsoft.com/office/drawing/2014/main" id="{AF959DAE-1BF4-AF51-4806-4F8B9FFADBAD}"/>
+              </a:ext>
+            </a:extLst>
+          </p:cNvPr>
+          <p:cNvSpPr txBox="1"/>
+          <p:nvPr/>
+        </p:nvSpPr>
+        <p:spPr>
+          <a:xfrm>
+            <a:off x="6244454" y="1978116"/>
+            <a:ext cx="910827" cy="276999"/>
+          </a:xfrm>
+          <a:prstGeom prst="rect">
+            <a:avLst/>
+          </a:prstGeom>
+          <a:noFill/>
+        </p:spPr>
+        <p:txBody>
+          <a:bodyPr wrap="none" rtlCol="0">
+            <a:spAutoFit/>
+          </a:bodyPr>
+          <a:lstStyle/>
+          <a:p>
+            <a:r>
+              <a:rPr lang="en-US" sz="1200" dirty="0">
+                <a:latin typeface="Arial" panose="020B0604020202020204" pitchFamily="34" charset="0"/>
+                <a:cs typeface="Arial" panose="020B0604020202020204" pitchFamily="34" charset="0"/>
+              </a:rPr>
+              <a:t>-15V MON</a:t>
+            </a:r>
+          </a:p>
+        </p:txBody>
+      </p:sp>
+      <p:sp>
+        <p:nvSpPr>
+          <p:cNvPr id="51" name="TextBox 50">
+            <a:extLst>
+              <a:ext uri="{FF2B5EF4-FFF2-40B4-BE49-F238E27FC236}">
+                <a16:creationId xmlns:a16="http://schemas.microsoft.com/office/drawing/2014/main" id="{691149E4-A334-771D-7EAB-E0A48181C117}"/>
+              </a:ext>
+            </a:extLst>
+          </p:cNvPr>
+          <p:cNvSpPr txBox="1"/>
+          <p:nvPr/>
+        </p:nvSpPr>
+        <p:spPr>
+          <a:xfrm>
+            <a:off x="5691677" y="2286017"/>
+            <a:ext cx="508473" cy="276999"/>
+          </a:xfrm>
+          <a:prstGeom prst="rect">
+            <a:avLst/>
+          </a:prstGeom>
+          <a:noFill/>
+        </p:spPr>
+        <p:txBody>
+          <a:bodyPr wrap="none" rtlCol="0">
+            <a:spAutoFit/>
+          </a:bodyPr>
+          <a:lstStyle/>
+          <a:p>
+            <a:r>
+              <a:rPr lang="en-US" sz="1200" dirty="0">
+                <a:latin typeface="Arial" panose="020B0604020202020204" pitchFamily="34" charset="0"/>
+                <a:cs typeface="Arial" panose="020B0604020202020204" pitchFamily="34" charset="0"/>
+              </a:rPr>
+              <a:t>ADC</a:t>
+            </a:r>
+          </a:p>
+        </p:txBody>
+      </p:sp>
+      <p:sp>
+        <p:nvSpPr>
+          <p:cNvPr id="52" name="TextBox 51">
+            <a:extLst>
+              <a:ext uri="{FF2B5EF4-FFF2-40B4-BE49-F238E27FC236}">
+                <a16:creationId xmlns:a16="http://schemas.microsoft.com/office/drawing/2014/main" id="{7D069C63-61C3-99D0-3027-90DFB249D379}"/>
+              </a:ext>
+            </a:extLst>
+          </p:cNvPr>
+          <p:cNvSpPr txBox="1"/>
+          <p:nvPr/>
+        </p:nvSpPr>
+        <p:spPr>
+          <a:xfrm>
+            <a:off x="6658090" y="2271335"/>
+            <a:ext cx="508473" cy="276999"/>
+          </a:xfrm>
+          <a:prstGeom prst="rect">
+            <a:avLst/>
+          </a:prstGeom>
+          <a:noFill/>
+        </p:spPr>
+        <p:txBody>
+          <a:bodyPr wrap="none" rtlCol="0">
+            <a:spAutoFit/>
+          </a:bodyPr>
+          <a:lstStyle/>
+          <a:p>
+            <a:r>
+              <a:rPr lang="en-US" sz="1200" dirty="0">
+                <a:latin typeface="Arial" panose="020B0604020202020204" pitchFamily="34" charset="0"/>
+                <a:cs typeface="Arial" panose="020B0604020202020204" pitchFamily="34" charset="0"/>
+              </a:rPr>
+              <a:t>ADC</a:t>
+            </a:r>
+          </a:p>
+        </p:txBody>
+      </p:sp>
     </p:spTree>
     <p:extLst>
       <p:ext uri="{BB962C8B-B14F-4D97-AF65-F5344CB8AC3E}">

</xml_diff>